<commit_message>
James VA edits ch 2.
</commit_message>
<xml_diff>
--- a/chapters/ch02-Boundaries/figures/buoyancy.pptx
+++ b/chapters/ch02-Boundaries/figures/buoyancy.pptx
@@ -104,7 +104,73 @@
       </a:defRPr>
     </a:lvl9pPr>
   </p:defaultTextStyle>
+  <p:extLst>
+    <p:ext uri="{EFAFB233-063F-42B5-8137-9DF3F51BA10A}">
+      <p15:sldGuideLst xmlns:p15="http://schemas.microsoft.com/office/powerpoint/2012/main"/>
+    </p:ext>
+  </p:extLst>
 </p:presentation>
+</file>
+
+<file path=ppt/revisionInfo.xml><?xml version="1.0" encoding="utf-8"?>
+<p1510:revInfo xmlns:a="http://schemas.openxmlformats.org/drawingml/2006/main" xmlns:r="http://schemas.openxmlformats.org/officeDocument/2006/relationships" xmlns:p1510="http://schemas.microsoft.com/office/powerpoint/2015/10/main">
+  <p1510:revLst>
+    <p1510:client id="{4A361EC3-EB25-4AAA-8EC1-4058F456DA71}" v="1" dt="2021-08-20T12:58:21.838"/>
+  </p1510:revLst>
+</p1510:revInfo>
+</file>
+
+<file path=ppt/changesInfos/changesInfo1.xml><?xml version="1.0" encoding="utf-8"?>
+<pc:chgInfo xmlns:a="http://schemas.openxmlformats.org/drawingml/2006/main" xmlns:r="http://schemas.openxmlformats.org/officeDocument/2006/relationships" xmlns:ac="http://schemas.microsoft.com/office/drawing/2013/main/command" xmlns:pc="http://schemas.microsoft.com/office/powerpoint/2013/main/command">
+  <pc:docChgLst>
+    <pc:chgData name="Jeremy VanAntwerp" userId="8194eec5-f905-41b3-ab18-0ee4e72177b5" providerId="ADAL" clId="{4A361EC3-EB25-4AAA-8EC1-4058F456DA71}"/>
+    <pc:docChg chg="undo custSel modSld">
+      <pc:chgData name="Jeremy VanAntwerp" userId="8194eec5-f905-41b3-ab18-0ee4e72177b5" providerId="ADAL" clId="{4A361EC3-EB25-4AAA-8EC1-4058F456DA71}" dt="2021-08-20T12:59:32.255" v="21" actId="14100"/>
+      <pc:docMkLst>
+        <pc:docMk/>
+      </pc:docMkLst>
+      <pc:sldChg chg="addSp delSp modSp mod">
+        <pc:chgData name="Jeremy VanAntwerp" userId="8194eec5-f905-41b3-ab18-0ee4e72177b5" providerId="ADAL" clId="{4A361EC3-EB25-4AAA-8EC1-4058F456DA71}" dt="2021-08-20T12:59:32.255" v="21" actId="14100"/>
+        <pc:sldMkLst>
+          <pc:docMk/>
+          <pc:sldMk cId="1754834708" sldId="256"/>
+        </pc:sldMkLst>
+        <pc:spChg chg="add del">
+          <ac:chgData name="Jeremy VanAntwerp" userId="8194eec5-f905-41b3-ab18-0ee4e72177b5" providerId="ADAL" clId="{4A361EC3-EB25-4AAA-8EC1-4058F456DA71}" dt="2021-08-20T12:56:58.238" v="5" actId="478"/>
+          <ac:spMkLst>
+            <pc:docMk/>
+            <pc:sldMk cId="1754834708" sldId="256"/>
+            <ac:spMk id="5" creationId="{EBC50D3E-856C-4791-A367-89E68D69B5BA}"/>
+          </ac:spMkLst>
+        </pc:spChg>
+        <pc:spChg chg="add mod">
+          <ac:chgData name="Jeremy VanAntwerp" userId="8194eec5-f905-41b3-ab18-0ee4e72177b5" providerId="ADAL" clId="{4A361EC3-EB25-4AAA-8EC1-4058F456DA71}" dt="2021-08-20T12:58:40.919" v="14" actId="14100"/>
+          <ac:spMkLst>
+            <pc:docMk/>
+            <pc:sldMk cId="1754834708" sldId="256"/>
+            <ac:spMk id="6" creationId="{8D84708D-72B3-4516-906F-058D281B24CC}"/>
+          </ac:spMkLst>
+        </pc:spChg>
+        <pc:spChg chg="add mod">
+          <ac:chgData name="Jeremy VanAntwerp" userId="8194eec5-f905-41b3-ab18-0ee4e72177b5" providerId="ADAL" clId="{4A361EC3-EB25-4AAA-8EC1-4058F456DA71}" dt="2021-08-20T12:59:32.255" v="21" actId="14100"/>
+          <ac:spMkLst>
+            <pc:docMk/>
+            <pc:sldMk cId="1754834708" sldId="256"/>
+            <ac:spMk id="34" creationId="{9F3E6CD0-D2BE-4799-806D-69608480EB30}"/>
+          </ac:spMkLst>
+        </pc:spChg>
+        <pc:cxnChg chg="add del mod">
+          <ac:chgData name="Jeremy VanAntwerp" userId="8194eec5-f905-41b3-ab18-0ee4e72177b5" providerId="ADAL" clId="{4A361EC3-EB25-4AAA-8EC1-4058F456DA71}" dt="2021-08-20T12:56:28.660" v="3" actId="11529"/>
+          <ac:cxnSpMkLst>
+            <pc:docMk/>
+            <pc:sldMk cId="1754834708" sldId="256"/>
+            <ac:cxnSpMk id="3" creationId="{81F9729F-B493-4047-94E3-6F9B5C4D3B53}"/>
+          </ac:cxnSpMkLst>
+        </pc:cxnChg>
+      </pc:sldChg>
+    </pc:docChg>
+  </pc:docChgLst>
+</pc:chgInfo>
 </file>
 
 <file path=ppt/slideLayouts/slideLayout1.xml><?xml version="1.0" encoding="utf-8"?>
@@ -254,7 +320,7 @@
           <a:p>
             <a:fld id="{407C4F3A-A8E3-4568-850B-252D9684C282}" type="datetimeFigureOut">
               <a:rPr lang="en-US" smtClean="0"/>
-              <a:t>7/7/2021</a:t>
+              <a:t>8/20/2021</a:t>
             </a:fld>
             <a:endParaRPr lang="en-US"/>
           </a:p>
@@ -452,7 +518,7 @@
           <a:p>
             <a:fld id="{407C4F3A-A8E3-4568-850B-252D9684C282}" type="datetimeFigureOut">
               <a:rPr lang="en-US" smtClean="0"/>
-              <a:t>7/7/2021</a:t>
+              <a:t>8/20/2021</a:t>
             </a:fld>
             <a:endParaRPr lang="en-US"/>
           </a:p>
@@ -660,7 +726,7 @@
           <a:p>
             <a:fld id="{407C4F3A-A8E3-4568-850B-252D9684C282}" type="datetimeFigureOut">
               <a:rPr lang="en-US" smtClean="0"/>
-              <a:t>7/7/2021</a:t>
+              <a:t>8/20/2021</a:t>
             </a:fld>
             <a:endParaRPr lang="en-US"/>
           </a:p>
@@ -858,7 +924,7 @@
           <a:p>
             <a:fld id="{407C4F3A-A8E3-4568-850B-252D9684C282}" type="datetimeFigureOut">
               <a:rPr lang="en-US" smtClean="0"/>
-              <a:t>7/7/2021</a:t>
+              <a:t>8/20/2021</a:t>
             </a:fld>
             <a:endParaRPr lang="en-US"/>
           </a:p>
@@ -1133,7 +1199,7 @@
           <a:p>
             <a:fld id="{407C4F3A-A8E3-4568-850B-252D9684C282}" type="datetimeFigureOut">
               <a:rPr lang="en-US" smtClean="0"/>
-              <a:t>7/7/2021</a:t>
+              <a:t>8/20/2021</a:t>
             </a:fld>
             <a:endParaRPr lang="en-US"/>
           </a:p>
@@ -1398,7 +1464,7 @@
           <a:p>
             <a:fld id="{407C4F3A-A8E3-4568-850B-252D9684C282}" type="datetimeFigureOut">
               <a:rPr lang="en-US" smtClean="0"/>
-              <a:t>7/7/2021</a:t>
+              <a:t>8/20/2021</a:t>
             </a:fld>
             <a:endParaRPr lang="en-US"/>
           </a:p>
@@ -1810,7 +1876,7 @@
           <a:p>
             <a:fld id="{407C4F3A-A8E3-4568-850B-252D9684C282}" type="datetimeFigureOut">
               <a:rPr lang="en-US" smtClean="0"/>
-              <a:t>7/7/2021</a:t>
+              <a:t>8/20/2021</a:t>
             </a:fld>
             <a:endParaRPr lang="en-US"/>
           </a:p>
@@ -1951,7 +2017,7 @@
           <a:p>
             <a:fld id="{407C4F3A-A8E3-4568-850B-252D9684C282}" type="datetimeFigureOut">
               <a:rPr lang="en-US" smtClean="0"/>
-              <a:t>7/7/2021</a:t>
+              <a:t>8/20/2021</a:t>
             </a:fld>
             <a:endParaRPr lang="en-US"/>
           </a:p>
@@ -2064,7 +2130,7 @@
           <a:p>
             <a:fld id="{407C4F3A-A8E3-4568-850B-252D9684C282}" type="datetimeFigureOut">
               <a:rPr lang="en-US" smtClean="0"/>
-              <a:t>7/7/2021</a:t>
+              <a:t>8/20/2021</a:t>
             </a:fld>
             <a:endParaRPr lang="en-US"/>
           </a:p>
@@ -2375,7 +2441,7 @@
           <a:p>
             <a:fld id="{407C4F3A-A8E3-4568-850B-252D9684C282}" type="datetimeFigureOut">
               <a:rPr lang="en-US" smtClean="0"/>
-              <a:t>7/7/2021</a:t>
+              <a:t>8/20/2021</a:t>
             </a:fld>
             <a:endParaRPr lang="en-US"/>
           </a:p>
@@ -2663,7 +2729,7 @@
           <a:p>
             <a:fld id="{407C4F3A-A8E3-4568-850B-252D9684C282}" type="datetimeFigureOut">
               <a:rPr lang="en-US" smtClean="0"/>
-              <a:t>7/7/2021</a:t>
+              <a:t>8/20/2021</a:t>
             </a:fld>
             <a:endParaRPr lang="en-US"/>
           </a:p>
@@ -2904,7 +2970,7 @@
           <a:p>
             <a:fld id="{407C4F3A-A8E3-4568-850B-252D9684C282}" type="datetimeFigureOut">
               <a:rPr lang="en-US" smtClean="0"/>
-              <a:t>7/7/2021</a:t>
+              <a:t>8/20/2021</a:t>
             </a:fld>
             <a:endParaRPr lang="en-US"/>
           </a:p>
@@ -4540,6 +4606,122 @@
           </p:txBody>
         </p:sp>
       </p:grpSp>
+      <p:sp>
+        <p:nvSpPr>
+          <p:cNvPr id="6" name="Arrow: Curved Right 5">
+            <a:extLst>
+              <a:ext uri="{FF2B5EF4-FFF2-40B4-BE49-F238E27FC236}">
+                <a16:creationId xmlns:a16="http://schemas.microsoft.com/office/drawing/2014/main" id="{8D84708D-72B3-4516-906F-058D281B24CC}"/>
+              </a:ext>
+            </a:extLst>
+          </p:cNvPr>
+          <p:cNvSpPr/>
+          <p:nvPr/>
+        </p:nvSpPr>
+        <p:spPr>
+          <a:xfrm>
+            <a:off x="2643739" y="2574471"/>
+            <a:ext cx="270843" cy="339604"/>
+          </a:xfrm>
+          <a:prstGeom prst="curvedRightArrow">
+            <a:avLst/>
+          </a:prstGeom>
+          <a:solidFill>
+            <a:srgbClr val="FF0000"/>
+          </a:solidFill>
+          <a:ln>
+            <a:solidFill>
+              <a:schemeClr val="tx1"/>
+            </a:solidFill>
+          </a:ln>
+        </p:spPr>
+        <p:style>
+          <a:lnRef idx="2">
+            <a:schemeClr val="accent1">
+              <a:shade val="50000"/>
+            </a:schemeClr>
+          </a:lnRef>
+          <a:fillRef idx="1">
+            <a:schemeClr val="accent1"/>
+          </a:fillRef>
+          <a:effectRef idx="0">
+            <a:schemeClr val="accent1"/>
+          </a:effectRef>
+          <a:fontRef idx="minor">
+            <a:schemeClr val="lt1"/>
+          </a:fontRef>
+        </p:style>
+        <p:txBody>
+          <a:bodyPr rtlCol="0" anchor="ctr"/>
+          <a:lstStyle/>
+          <a:p>
+            <a:pPr algn="ctr"/>
+            <a:endParaRPr lang="en-US">
+              <a:solidFill>
+                <a:schemeClr val="tx1"/>
+              </a:solidFill>
+            </a:endParaRPr>
+          </a:p>
+        </p:txBody>
+      </p:sp>
+      <p:sp>
+        <p:nvSpPr>
+          <p:cNvPr id="34" name="Arrow: Curved Right 33">
+            <a:extLst>
+              <a:ext uri="{FF2B5EF4-FFF2-40B4-BE49-F238E27FC236}">
+                <a16:creationId xmlns:a16="http://schemas.microsoft.com/office/drawing/2014/main" id="{9F3E6CD0-D2BE-4799-806D-69608480EB30}"/>
+              </a:ext>
+            </a:extLst>
+          </p:cNvPr>
+          <p:cNvSpPr/>
+          <p:nvPr/>
+        </p:nvSpPr>
+        <p:spPr>
+          <a:xfrm flipH="1">
+            <a:off x="5748742" y="2473229"/>
+            <a:ext cx="396595" cy="710227"/>
+          </a:xfrm>
+          <a:prstGeom prst="curvedRightArrow">
+            <a:avLst/>
+          </a:prstGeom>
+          <a:solidFill>
+            <a:srgbClr val="FF0000"/>
+          </a:solidFill>
+          <a:ln>
+            <a:solidFill>
+              <a:schemeClr val="tx1"/>
+            </a:solidFill>
+          </a:ln>
+        </p:spPr>
+        <p:style>
+          <a:lnRef idx="2">
+            <a:schemeClr val="accent1">
+              <a:shade val="50000"/>
+            </a:schemeClr>
+          </a:lnRef>
+          <a:fillRef idx="1">
+            <a:schemeClr val="accent1"/>
+          </a:fillRef>
+          <a:effectRef idx="0">
+            <a:schemeClr val="accent1"/>
+          </a:effectRef>
+          <a:fontRef idx="minor">
+            <a:schemeClr val="lt1"/>
+          </a:fontRef>
+        </p:style>
+        <p:txBody>
+          <a:bodyPr rtlCol="0" anchor="ctr"/>
+          <a:lstStyle/>
+          <a:p>
+            <a:pPr algn="ctr"/>
+            <a:endParaRPr lang="en-US">
+              <a:solidFill>
+                <a:schemeClr val="tx1"/>
+              </a:solidFill>
+            </a:endParaRPr>
+          </a:p>
+        </p:txBody>
+      </p:sp>
     </p:spTree>
     <p:extLst>
       <p:ext uri="{BB962C8B-B14F-4D97-AF65-F5344CB8AC3E}">

</xml_diff>